<commit_message>
HEX v220cm D-pad fix
</commit_message>
<xml_diff>
--- a/brWheel_my/wirings/Firmware-v22x pinout.pptx
+++ b/brWheel_my/wirings/Firmware-v22x pinout.pptx
@@ -241,7 +241,7 @@
           <a:p>
             <a:fld id="{A398FB1A-F8C3-427F-BE44-B87966AC4D7F}" type="datetimeFigureOut">
               <a:rPr lang="en-US" smtClean="0"/>
-              <a:t>03-Nov-22</a:t>
+              <a:t>25-Dec-22</a:t>
             </a:fld>
             <a:endParaRPr lang="en-US"/>
           </a:p>
@@ -409,7 +409,7 @@
           <a:p>
             <a:fld id="{A398FB1A-F8C3-427F-BE44-B87966AC4D7F}" type="datetimeFigureOut">
               <a:rPr lang="en-US" smtClean="0"/>
-              <a:t>03-Nov-22</a:t>
+              <a:t>25-Dec-22</a:t>
             </a:fld>
             <a:endParaRPr lang="en-US"/>
           </a:p>
@@ -587,7 +587,7 @@
           <a:p>
             <a:fld id="{A398FB1A-F8C3-427F-BE44-B87966AC4D7F}" type="datetimeFigureOut">
               <a:rPr lang="en-US" smtClean="0"/>
-              <a:t>03-Nov-22</a:t>
+              <a:t>25-Dec-22</a:t>
             </a:fld>
             <a:endParaRPr lang="en-US"/>
           </a:p>
@@ -755,7 +755,7 @@
           <a:p>
             <a:fld id="{A398FB1A-F8C3-427F-BE44-B87966AC4D7F}" type="datetimeFigureOut">
               <a:rPr lang="en-US" smtClean="0"/>
-              <a:t>03-Nov-22</a:t>
+              <a:t>25-Dec-22</a:t>
             </a:fld>
             <a:endParaRPr lang="en-US"/>
           </a:p>
@@ -1000,7 +1000,7 @@
           <a:p>
             <a:fld id="{A398FB1A-F8C3-427F-BE44-B87966AC4D7F}" type="datetimeFigureOut">
               <a:rPr lang="en-US" smtClean="0"/>
-              <a:t>03-Nov-22</a:t>
+              <a:t>25-Dec-22</a:t>
             </a:fld>
             <a:endParaRPr lang="en-US"/>
           </a:p>
@@ -1229,7 +1229,7 @@
           <a:p>
             <a:fld id="{A398FB1A-F8C3-427F-BE44-B87966AC4D7F}" type="datetimeFigureOut">
               <a:rPr lang="en-US" smtClean="0"/>
-              <a:t>03-Nov-22</a:t>
+              <a:t>25-Dec-22</a:t>
             </a:fld>
             <a:endParaRPr lang="en-US"/>
           </a:p>
@@ -1593,7 +1593,7 @@
           <a:p>
             <a:fld id="{A398FB1A-F8C3-427F-BE44-B87966AC4D7F}" type="datetimeFigureOut">
               <a:rPr lang="en-US" smtClean="0"/>
-              <a:t>03-Nov-22</a:t>
+              <a:t>25-Dec-22</a:t>
             </a:fld>
             <a:endParaRPr lang="en-US"/>
           </a:p>
@@ -1710,7 +1710,7 @@
           <a:p>
             <a:fld id="{A398FB1A-F8C3-427F-BE44-B87966AC4D7F}" type="datetimeFigureOut">
               <a:rPr lang="en-US" smtClean="0"/>
-              <a:t>03-Nov-22</a:t>
+              <a:t>25-Dec-22</a:t>
             </a:fld>
             <a:endParaRPr lang="en-US"/>
           </a:p>
@@ -1805,7 +1805,7 @@
           <a:p>
             <a:fld id="{A398FB1A-F8C3-427F-BE44-B87966AC4D7F}" type="datetimeFigureOut">
               <a:rPr lang="en-US" smtClean="0"/>
-              <a:t>03-Nov-22</a:t>
+              <a:t>25-Dec-22</a:t>
             </a:fld>
             <a:endParaRPr lang="en-US"/>
           </a:p>
@@ -2080,7 +2080,7 @@
           <a:p>
             <a:fld id="{A398FB1A-F8C3-427F-BE44-B87966AC4D7F}" type="datetimeFigureOut">
               <a:rPr lang="en-US" smtClean="0"/>
-              <a:t>03-Nov-22</a:t>
+              <a:t>25-Dec-22</a:t>
             </a:fld>
             <a:endParaRPr lang="en-US"/>
           </a:p>
@@ -2332,7 +2332,7 @@
           <a:p>
             <a:fld id="{A398FB1A-F8C3-427F-BE44-B87966AC4D7F}" type="datetimeFigureOut">
               <a:rPr lang="en-US" smtClean="0"/>
-              <a:t>03-Nov-22</a:t>
+              <a:t>25-Dec-22</a:t>
             </a:fld>
             <a:endParaRPr lang="en-US"/>
           </a:p>
@@ -2543,7 +2543,7 @@
           <a:p>
             <a:fld id="{A398FB1A-F8C3-427F-BE44-B87966AC4D7F}" type="datetimeFigureOut">
               <a:rPr lang="en-US" smtClean="0"/>
-              <a:t>03-Nov-22</a:t>
+              <a:t>25-Dec-22</a:t>
             </a:fld>
             <a:endParaRPr lang="en-US"/>
           </a:p>
@@ -2969,7 +2969,7 @@
         </p:blipFill>
         <p:spPr>
           <a:xfrm>
-            <a:off x="428877" y="873940"/>
+            <a:off x="428877" y="454490"/>
             <a:ext cx="4539633" cy="3455299"/>
           </a:xfrm>
           <a:prstGeom prst="rect">
@@ -3066,19 +3066,7 @@
             </a:r>
             <a:r>
               <a:rPr lang="en-US" dirty="0" smtClean="0"/>
-              <a:t>fw-v220</a:t>
-            </a:r>
-            <a:r>
-              <a:rPr lang="en-US" dirty="0" smtClean="0"/>
-              <a:t>, or XY shifter </a:t>
-            </a:r>
-            <a:r>
-              <a:rPr lang="en-US" dirty="0" smtClean="0"/>
-              <a:t>fw-v220f</a:t>
-            </a:r>
-            <a:r>
-              <a:rPr lang="en-US" dirty="0" smtClean="0"/>
-              <a:t>)</a:t>
+              <a:t>fw-v220, or XY shifter fw-v220f)</a:t>
             </a:r>
             <a:endParaRPr lang="en-US" dirty="0"/>
           </a:p>
@@ -3121,33 +3109,13 @@
             </a:r>
             <a:r>
               <a:rPr lang="en-US" dirty="0" smtClean="0"/>
-              <a:t>fw-v222</a:t>
-            </a:r>
+              <a:t>fw-v222, or button0 in fw-v220)</a:t>
+            </a:r>
+          </a:p>
+          <a:p>
             <a:r>
               <a:rPr lang="en-US" dirty="0" smtClean="0"/>
-              <a:t>, or button0 in </a:t>
-            </a:r>
-            <a:r>
-              <a:rPr lang="en-US" dirty="0" smtClean="0"/>
-              <a:t>fw-v220</a:t>
-            </a:r>
-            <a:r>
-              <a:rPr lang="en-US" dirty="0" smtClean="0"/>
-              <a:t>)</a:t>
-            </a:r>
-          </a:p>
-          <a:p>
-            <a:r>
-              <a:rPr lang="en-US" dirty="0" smtClean="0"/>
-              <a:t>5 - CLK pin for HX711 (</a:t>
-            </a:r>
-            <a:r>
-              <a:rPr lang="en-US" dirty="0" smtClean="0"/>
-              <a:t>fw-v222</a:t>
-            </a:r>
-            <a:r>
-              <a:rPr lang="en-US" dirty="0" smtClean="0"/>
-              <a:t>, </a:t>
+              <a:t>5 - CLK pin for HX711 (fw-v222, </a:t>
             </a:r>
             <a:r>
               <a:rPr lang="en-US" dirty="0"/>
@@ -3319,8 +3287,8 @@
           <a:stretch/>
         </p:blipFill>
         <p:spPr>
-          <a:xfrm>
-            <a:off x="700784" y="4915859"/>
+          <a:xfrm rot="5400000">
+            <a:off x="400987" y="4780409"/>
             <a:ext cx="2473394" cy="1545580"/>
           </a:xfrm>
           <a:prstGeom prst="rect">
@@ -3336,7 +3304,7 @@
         </p:nvSpPr>
         <p:spPr>
           <a:xfrm>
-            <a:off x="700784" y="339866"/>
+            <a:off x="700784" y="105198"/>
             <a:ext cx="2729850" cy="369332"/>
           </a:xfrm>
           <a:prstGeom prst="rect">
@@ -3365,7 +3333,7 @@
         </p:nvSpPr>
         <p:spPr>
           <a:xfrm>
-            <a:off x="700784" y="4478343"/>
+            <a:off x="700784" y="3912833"/>
             <a:ext cx="1903726" cy="369332"/>
           </a:xfrm>
           <a:prstGeom prst="rect">
@@ -3399,8 +3367,8 @@
         </p:nvSpPr>
         <p:spPr>
           <a:xfrm>
-            <a:off x="3277900" y="4316502"/>
-            <a:ext cx="3552704" cy="2585323"/>
+            <a:off x="2559889" y="3929611"/>
+            <a:ext cx="4460067" cy="2585323"/>
           </a:xfrm>
           <a:prstGeom prst="rect">
             <a:avLst/>
@@ -3438,8 +3406,13 @@
           <a:p>
             <a:r>
               <a:rPr lang="en-US" dirty="0"/>
-              <a:t>  3 - FFB clipping LED</a:t>
-            </a:r>
+              <a:t>  3 - FFB clipping </a:t>
+            </a:r>
+            <a:r>
+              <a:rPr lang="en-US" dirty="0" smtClean="0"/>
+              <a:t>LED, or button3 (fw-v220cm)</a:t>
+            </a:r>
+            <a:endParaRPr lang="en-US" dirty="0"/>
           </a:p>
           <a:p>
             <a:r>
@@ -3480,13 +3453,22 @@
             </a:r>
             <a:r>
               <a:rPr lang="en-US" dirty="0"/>
-              <a:t>)</a:t>
-            </a:r>
-          </a:p>
-          <a:p>
-            <a:r>
-              <a:rPr lang="en-US" dirty="0"/>
-              <a:t>       or Z-index encoder (</a:t>
+              <a:t>), or </a:t>
+            </a:r>
+            <a:endParaRPr lang="en-US" dirty="0"/>
+          </a:p>
+          <a:p>
+            <a:r>
+              <a:rPr lang="en-US" dirty="0"/>
+              <a:t> </a:t>
+            </a:r>
+            <a:r>
+              <a:rPr lang="en-US" dirty="0" smtClean="0"/>
+              <a:t>       encoder </a:t>
+            </a:r>
+            <a:r>
+              <a:rPr lang="en-US" dirty="0"/>
+              <a:t>Z-index (</a:t>
             </a:r>
             <a:r>
               <a:rPr lang="en-US" dirty="0" smtClean="0"/>
@@ -3494,25 +3476,18 @@
             </a:r>
             <a:r>
               <a:rPr lang="en-US" dirty="0" smtClean="0"/>
-              <a:t>)</a:t>
-            </a:r>
-          </a:p>
-          <a:p>
-            <a:r>
-              <a:rPr lang="en-US" dirty="0"/>
-              <a:t> </a:t>
-            </a:r>
+              <a:t>), or</a:t>
+            </a:r>
+            <a:endParaRPr lang="en-US" dirty="0" smtClean="0"/>
+          </a:p>
+          <a:p>
             <a:r>
               <a:rPr lang="en-US" dirty="0" smtClean="0"/>
-              <a:t>      or center button (</a:t>
+              <a:t>        center </a:t>
             </a:r>
             <a:r>
               <a:rPr lang="en-US" dirty="0" smtClean="0"/>
-              <a:t>fw-v220cm</a:t>
-            </a:r>
-            <a:r>
-              <a:rPr lang="en-US" dirty="0" smtClean="0"/>
-              <a:t>)</a:t>
+              <a:t>button (fw-v220cm)</a:t>
             </a:r>
             <a:endParaRPr lang="en-US" dirty="0"/>
           </a:p>
@@ -3587,7 +3562,7 @@
         </p:nvSpPr>
         <p:spPr>
           <a:xfrm>
-            <a:off x="5094896" y="2232257"/>
+            <a:off x="5094896" y="1812807"/>
             <a:ext cx="1675139" cy="738664"/>
           </a:xfrm>
           <a:prstGeom prst="rect">

</xml_diff>